<commit_message>
Add corrections and demo
</commit_message>
<xml_diff>
--- a/06. Data Storage/Mod 9. File Management and storage (RUS).pptx
+++ b/06. Data Storage/Mod 9. File Management and storage (RUS).pptx
@@ -5,7 +5,7 @@
     <p:sldMasterId id="2147483715" r:id="rId1"/>
   </p:sldMasterIdLst>
   <p:notesMasterIdLst>
-    <p:notesMasterId r:id="rId27"/>
+    <p:notesMasterId r:id="rId26"/>
   </p:notesMasterIdLst>
   <p:sldIdLst>
     <p:sldId id="312" r:id="rId2"/>
@@ -20,19 +20,18 @@
     <p:sldId id="270" r:id="rId11"/>
     <p:sldId id="309" r:id="rId12"/>
     <p:sldId id="317" r:id="rId13"/>
-    <p:sldId id="271" r:id="rId14"/>
-    <p:sldId id="278" r:id="rId15"/>
-    <p:sldId id="281" r:id="rId16"/>
-    <p:sldId id="279" r:id="rId17"/>
-    <p:sldId id="286" r:id="rId18"/>
-    <p:sldId id="288" r:id="rId19"/>
-    <p:sldId id="316" r:id="rId20"/>
-    <p:sldId id="289" r:id="rId21"/>
-    <p:sldId id="306" r:id="rId22"/>
-    <p:sldId id="307" r:id="rId23"/>
-    <p:sldId id="297" r:id="rId24"/>
-    <p:sldId id="315" r:id="rId25"/>
-    <p:sldId id="313" r:id="rId26"/>
+    <p:sldId id="278" r:id="rId14"/>
+    <p:sldId id="281" r:id="rId15"/>
+    <p:sldId id="279" r:id="rId16"/>
+    <p:sldId id="286" r:id="rId17"/>
+    <p:sldId id="288" r:id="rId18"/>
+    <p:sldId id="316" r:id="rId19"/>
+    <p:sldId id="289" r:id="rId20"/>
+    <p:sldId id="306" r:id="rId21"/>
+    <p:sldId id="307" r:id="rId22"/>
+    <p:sldId id="297" r:id="rId23"/>
+    <p:sldId id="315" r:id="rId24"/>
+    <p:sldId id="313" r:id="rId25"/>
   </p:sldIdLst>
   <p:sldSz cx="12192000" cy="6858000"/>
   <p:notesSz cx="6858000" cy="9144000"/>
@@ -949,7 +948,7 @@
             <a:fld id="{B4008EB6-D09E-4580-8CD6-DDB14511944F}" type="slidenum">
               <a:rPr lang="en-US" smtClean="0"/>
               <a:pPr/>
-              <a:t>20</a:t>
+              <a:t>19</a:t>
             </a:fld>
             <a:endParaRPr lang="en-US" dirty="0"/>
           </a:p>
@@ -1917,7 +1916,7 @@
             <a:fld id="{B4008EB6-D09E-4580-8CD6-DDB14511944F}" type="slidenum">
               <a:rPr lang="en-US" smtClean="0"/>
               <a:pPr/>
-              <a:t>15</a:t>
+              <a:t>14</a:t>
             </a:fld>
             <a:endParaRPr lang="en-US" dirty="0"/>
           </a:p>
@@ -2071,7 +2070,7 @@
           <a:p>
             <a:fld id="{29AB4647-7887-4ABA-813C-F50384827C09}" type="slidenum">
               <a:rPr lang="en-GB" smtClean="0"/>
-              <a:t>16</a:t>
+              <a:t>15</a:t>
             </a:fld>
             <a:endParaRPr lang="en-GB"/>
           </a:p>
@@ -2274,7 +2273,7 @@
             <a:fld id="{B4008EB6-D09E-4580-8CD6-DDB14511944F}" type="slidenum">
               <a:rPr lang="en-US" smtClean="0"/>
               <a:pPr/>
-              <a:t>18</a:t>
+              <a:t>17</a:t>
             </a:fld>
             <a:endParaRPr lang="en-US" dirty="0"/>
           </a:p>
@@ -2477,7 +2476,7 @@
             <a:fld id="{B4008EB6-D09E-4580-8CD6-DDB14511944F}" type="slidenum">
               <a:rPr lang="en-US" smtClean="0"/>
               <a:pPr/>
-              <a:t>19</a:t>
+              <a:t>18</a:t>
             </a:fld>
             <a:endParaRPr lang="en-US" dirty="0"/>
           </a:p>
@@ -22535,90 +22534,6 @@
       </p:grpSpPr>
       <p:sp>
         <p:nvSpPr>
-          <p:cNvPr id="4" name="Title 3"/>
-          <p:cNvSpPr>
-            <a:spLocks noGrp="1"/>
-          </p:cNvSpPr>
-          <p:nvPr>
-            <p:ph type="ctrTitle"/>
-          </p:nvPr>
-        </p:nvSpPr>
-        <p:spPr>
-          <a:xfrm>
-            <a:off x="269239" y="2579602"/>
-            <a:ext cx="11637012" cy="1698798"/>
-          </a:xfrm>
-        </p:spPr>
-        <p:txBody>
-          <a:bodyPr/>
-          <a:lstStyle/>
-          <a:p>
-            <a:r>
-              <a:rPr lang="ru-RU" dirty="0" err="1" smtClean="0"/>
-              <a:t>Демо</a:t>
-            </a:r>
-            <a:r>
-              <a:rPr lang="ru-RU" dirty="0" smtClean="0"/>
-              <a:t>:</a:t>
-            </a:r>
-            <a:br>
-              <a:rPr lang="ru-RU" dirty="0" smtClean="0"/>
-            </a:br>
-            <a:r>
-              <a:rPr lang="ru-RU" dirty="0" smtClean="0"/>
-              <a:t>Работа с файлами</a:t>
-            </a:r>
-            <a:endParaRPr lang="en-GB" dirty="0"/>
-          </a:p>
-        </p:txBody>
-      </p:sp>
-    </p:spTree>
-    <p:extLst>
-      <p:ext uri="{BB962C8B-B14F-4D97-AF65-F5344CB8AC3E}">
-        <p14:creationId xmlns:p14="http://schemas.microsoft.com/office/powerpoint/2010/main" val="751648099"/>
-      </p:ext>
-    </p:extLst>
-  </p:cSld>
-  <p:clrMapOvr>
-    <a:masterClrMapping/>
-  </p:clrMapOvr>
-  <mc:AlternateContent xmlns:mc="http://schemas.openxmlformats.org/markup-compatibility/2006" xmlns:p14="http://schemas.microsoft.com/office/powerpoint/2010/main">
-    <mc:Choice Requires="p14">
-      <p:transition p14:dur="0"/>
-    </mc:Choice>
-    <mc:Fallback xmlns="">
-      <p:transition/>
-    </mc:Fallback>
-  </mc:AlternateContent>
-  <p:timing>
-    <p:tnLst>
-      <p:par>
-        <p:cTn id="1" dur="indefinite" restart="never" nodeType="tmRoot"/>
-      </p:par>
-    </p:tnLst>
-  </p:timing>
-</p:sld>
-</file>
-
-<file path=ppt/slides/slide14.xml><?xml version="1.0" encoding="utf-8"?>
-<p:sld xmlns:a="http://schemas.openxmlformats.org/drawingml/2006/main" xmlns:r="http://schemas.openxmlformats.org/officeDocument/2006/relationships" xmlns:p="http://schemas.openxmlformats.org/presentationml/2006/main">
-  <p:cSld>
-    <p:spTree>
-      <p:nvGrpSpPr>
-        <p:cNvPr id="1" name=""/>
-        <p:cNvGrpSpPr/>
-        <p:nvPr/>
-      </p:nvGrpSpPr>
-      <p:grpSpPr>
-        <a:xfrm>
-          <a:off x="0" y="0"/>
-          <a:ext cx="0" cy="0"/>
-          <a:chOff x="0" y="0"/>
-          <a:chExt cx="0" cy="0"/>
-        </a:xfrm>
-      </p:grpSpPr>
-      <p:sp>
-        <p:nvSpPr>
           <p:cNvPr id="7" name="Title 6"/>
           <p:cNvSpPr>
             <a:spLocks noGrp="1"/>
@@ -22692,7 +22607,7 @@
 </p:sld>
 </file>
 
-<file path=ppt/slides/slide15.xml><?xml version="1.0" encoding="utf-8"?>
+<file path=ppt/slides/slide14.xml><?xml version="1.0" encoding="utf-8"?>
 <p:sld xmlns:a="http://schemas.openxmlformats.org/drawingml/2006/main" xmlns:r="http://schemas.openxmlformats.org/officeDocument/2006/relationships" xmlns:p="http://schemas.openxmlformats.org/presentationml/2006/main">
   <p:cSld>
     <p:spTree>
@@ -23017,7 +22932,7 @@
 </p:sld>
 </file>
 
-<file path=ppt/slides/slide16.xml><?xml version="1.0" encoding="utf-8"?>
+<file path=ppt/slides/slide15.xml><?xml version="1.0" encoding="utf-8"?>
 <p:sld xmlns:a="http://schemas.openxmlformats.org/drawingml/2006/main" xmlns:r="http://schemas.openxmlformats.org/officeDocument/2006/relationships" xmlns:p="http://schemas.openxmlformats.org/presentationml/2006/main">
   <p:cSld>
     <p:spTree>
@@ -23216,7 +23131,7 @@
 </p:sld>
 </file>
 
-<file path=ppt/slides/slide17.xml><?xml version="1.0" encoding="utf-8"?>
+<file path=ppt/slides/slide16.xml><?xml version="1.0" encoding="utf-8"?>
 <p:sld xmlns:a="http://schemas.openxmlformats.org/drawingml/2006/main" xmlns:r="http://schemas.openxmlformats.org/officeDocument/2006/relationships" xmlns:p="http://schemas.openxmlformats.org/presentationml/2006/main">
   <p:cSld>
     <p:spTree>
@@ -23308,7 +23223,7 @@
 </p:sld>
 </file>
 
-<file path=ppt/slides/slide18.xml><?xml version="1.0" encoding="utf-8"?>
+<file path=ppt/slides/slide17.xml><?xml version="1.0" encoding="utf-8"?>
 <p:sld xmlns:a="http://schemas.openxmlformats.org/drawingml/2006/main" xmlns:r="http://schemas.openxmlformats.org/officeDocument/2006/relationships" xmlns:p="http://schemas.openxmlformats.org/presentationml/2006/main">
   <p:cSld>
     <p:spTree>
@@ -23636,7 +23551,7 @@
 </p:sld>
 </file>
 
-<file path=ppt/slides/slide19.xml><?xml version="1.0" encoding="utf-8"?>
+<file path=ppt/slides/slide18.xml><?xml version="1.0" encoding="utf-8"?>
 <p:sld xmlns:a="http://schemas.openxmlformats.org/drawingml/2006/main" xmlns:r="http://schemas.openxmlformats.org/officeDocument/2006/relationships" xmlns:p="http://schemas.openxmlformats.org/presentationml/2006/main">
   <p:cSld>
     <p:spTree>
@@ -24124,6 +24039,173 @@
 </p:sld>
 </file>
 
+<file path=ppt/slides/slide19.xml><?xml version="1.0" encoding="utf-8"?>
+<p:sld xmlns:a="http://schemas.openxmlformats.org/drawingml/2006/main" xmlns:r="http://schemas.openxmlformats.org/officeDocument/2006/relationships" xmlns:p="http://schemas.openxmlformats.org/presentationml/2006/main">
+  <p:cSld>
+    <p:spTree>
+      <p:nvGrpSpPr>
+        <p:cNvPr id="1" name=""/>
+        <p:cNvGrpSpPr/>
+        <p:nvPr/>
+      </p:nvGrpSpPr>
+      <p:grpSpPr>
+        <a:xfrm>
+          <a:off x="0" y="0"/>
+          <a:ext cx="0" cy="0"/>
+          <a:chOff x="0" y="0"/>
+          <a:chExt cx="0" cy="0"/>
+        </a:xfrm>
+      </p:grpSpPr>
+      <p:sp>
+        <p:nvSpPr>
+          <p:cNvPr id="10" name="Title 9"/>
+          <p:cNvSpPr>
+            <a:spLocks noGrp="1"/>
+          </p:cNvSpPr>
+          <p:nvPr>
+            <p:ph type="title" idx="4294967295"/>
+          </p:nvPr>
+        </p:nvSpPr>
+        <p:spPr>
+          <a:xfrm>
+            <a:off x="257175" y="222251"/>
+            <a:ext cx="11652250" cy="982662"/>
+          </a:xfrm>
+        </p:spPr>
+        <p:txBody>
+          <a:bodyPr/>
+          <a:lstStyle/>
+          <a:p>
+            <a:r>
+              <a:rPr lang="ru-RU" dirty="0" smtClean="0"/>
+              <a:t>Файловые диалоги</a:t>
+            </a:r>
+            <a:endParaRPr lang="en-US" dirty="0"/>
+          </a:p>
+        </p:txBody>
+      </p:sp>
+      <p:sp>
+        <p:nvSpPr>
+          <p:cNvPr id="11" name="Text Placeholder 10"/>
+          <p:cNvSpPr>
+            <a:spLocks noGrp="1"/>
+          </p:cNvSpPr>
+          <p:nvPr>
+            <p:ph type="body" sz="quarter" idx="4294967295"/>
+          </p:nvPr>
+        </p:nvSpPr>
+        <p:spPr>
+          <a:xfrm>
+            <a:off x="257175" y="1204913"/>
+            <a:ext cx="6346825" cy="5653087"/>
+          </a:xfrm>
+        </p:spPr>
+        <p:txBody>
+          <a:bodyPr/>
+          <a:lstStyle/>
+          <a:p>
+            <a:r>
+              <a:rPr lang="ru-RU" sz="2800" dirty="0" smtClean="0">
+                <a:latin typeface="+mn-lt"/>
+              </a:rPr>
+              <a:t>Приложение не интересует откуда берутся файлы или куда отправляются </a:t>
+            </a:r>
+            <a:endParaRPr lang="en-US" sz="2800" dirty="0" smtClean="0">
+              <a:latin typeface="+mn-lt"/>
+            </a:endParaRPr>
+          </a:p>
+          <a:p>
+            <a:pPr lvl="1"/>
+            <a:endParaRPr lang="ru-RU" sz="2800" dirty="0" smtClean="0"/>
+          </a:p>
+          <a:p>
+            <a:pPr lvl="1"/>
+            <a:r>
+              <a:rPr lang="ru-RU" sz="2800" dirty="0">
+                <a:solidFill>
+                  <a:schemeClr val="accent1"/>
+                </a:solidFill>
+              </a:rPr>
+              <a:t>Простой </a:t>
+            </a:r>
+            <a:r>
+              <a:rPr lang="ru-RU" sz="2800" dirty="0" smtClean="0">
+                <a:solidFill>
+                  <a:schemeClr val="accent1"/>
+                </a:solidFill>
+              </a:rPr>
+              <a:t>доступ </a:t>
+            </a:r>
+            <a:r>
+              <a:rPr lang="ru-RU" sz="2800" dirty="0">
+                <a:solidFill>
+                  <a:schemeClr val="accent1"/>
+                </a:solidFill>
+              </a:rPr>
+              <a:t>к облаку, устройству или </a:t>
+            </a:r>
+            <a:r>
+              <a:rPr lang="ru-RU" sz="2800" dirty="0" smtClean="0">
+                <a:solidFill>
+                  <a:schemeClr val="accent1"/>
+                </a:solidFill>
+              </a:rPr>
+              <a:t>в другое приложение </a:t>
+            </a:r>
+            <a:r>
+              <a:rPr lang="ru-RU" sz="2800" dirty="0">
+                <a:solidFill>
+                  <a:schemeClr val="accent1"/>
+                </a:solidFill>
+              </a:rPr>
+              <a:t>для получения файла </a:t>
+            </a:r>
+          </a:p>
+          <a:p>
+            <a:pPr lvl="1"/>
+            <a:endParaRPr lang="ru-RU" sz="2800" dirty="0" smtClean="0"/>
+          </a:p>
+          <a:p>
+            <a:pPr lvl="1"/>
+            <a:r>
+              <a:rPr lang="ru-RU" sz="2800" dirty="0" smtClean="0">
+                <a:solidFill>
+                  <a:schemeClr val="accent1"/>
+                </a:solidFill>
+              </a:rPr>
+              <a:t>Поддержка операций Открыть и Сохранить </a:t>
+            </a:r>
+          </a:p>
+        </p:txBody>
+      </p:sp>
+    </p:spTree>
+    <p:extLst>
+      <p:ext uri="{BB962C8B-B14F-4D97-AF65-F5344CB8AC3E}">
+        <p14:creationId xmlns:p14="http://schemas.microsoft.com/office/powerpoint/2010/main" val="1540423197"/>
+      </p:ext>
+    </p:extLst>
+  </p:cSld>
+  <p:clrMapOvr>
+    <a:masterClrMapping/>
+  </p:clrMapOvr>
+  <mc:AlternateContent xmlns:mc="http://schemas.openxmlformats.org/markup-compatibility/2006" xmlns:p14="http://schemas.microsoft.com/office/powerpoint/2010/main">
+    <mc:Choice Requires="p14">
+      <p:transition p14:dur="0"/>
+    </mc:Choice>
+    <mc:Fallback xmlns="">
+      <p:transition/>
+    </mc:Fallback>
+  </mc:AlternateContent>
+  <p:timing>
+    <p:tnLst>
+      <p:par>
+        <p:cTn id="1" dur="indefinite" restart="never" nodeType="tmRoot"/>
+      </p:par>
+    </p:tnLst>
+  </p:timing>
+</p:sld>
+</file>
+
 <file path=ppt/slides/slide2.xml><?xml version="1.0" encoding="utf-8"?>
 <p:sld xmlns:a="http://schemas.openxmlformats.org/drawingml/2006/main" xmlns:r="http://schemas.openxmlformats.org/officeDocument/2006/relationships" xmlns:p="http://schemas.openxmlformats.org/presentationml/2006/main">
   <p:cSld>
@@ -24285,173 +24367,6 @@
 </file>
 
 <file path=ppt/slides/slide20.xml><?xml version="1.0" encoding="utf-8"?>
-<p:sld xmlns:a="http://schemas.openxmlformats.org/drawingml/2006/main" xmlns:r="http://schemas.openxmlformats.org/officeDocument/2006/relationships" xmlns:p="http://schemas.openxmlformats.org/presentationml/2006/main">
-  <p:cSld>
-    <p:spTree>
-      <p:nvGrpSpPr>
-        <p:cNvPr id="1" name=""/>
-        <p:cNvGrpSpPr/>
-        <p:nvPr/>
-      </p:nvGrpSpPr>
-      <p:grpSpPr>
-        <a:xfrm>
-          <a:off x="0" y="0"/>
-          <a:ext cx="0" cy="0"/>
-          <a:chOff x="0" y="0"/>
-          <a:chExt cx="0" cy="0"/>
-        </a:xfrm>
-      </p:grpSpPr>
-      <p:sp>
-        <p:nvSpPr>
-          <p:cNvPr id="10" name="Title 9"/>
-          <p:cNvSpPr>
-            <a:spLocks noGrp="1"/>
-          </p:cNvSpPr>
-          <p:nvPr>
-            <p:ph type="title" idx="4294967295"/>
-          </p:nvPr>
-        </p:nvSpPr>
-        <p:spPr>
-          <a:xfrm>
-            <a:off x="257175" y="222251"/>
-            <a:ext cx="11652250" cy="982662"/>
-          </a:xfrm>
-        </p:spPr>
-        <p:txBody>
-          <a:bodyPr/>
-          <a:lstStyle/>
-          <a:p>
-            <a:r>
-              <a:rPr lang="ru-RU" dirty="0" smtClean="0"/>
-              <a:t>Файловые диалоги</a:t>
-            </a:r>
-            <a:endParaRPr lang="en-US" dirty="0"/>
-          </a:p>
-        </p:txBody>
-      </p:sp>
-      <p:sp>
-        <p:nvSpPr>
-          <p:cNvPr id="11" name="Text Placeholder 10"/>
-          <p:cNvSpPr>
-            <a:spLocks noGrp="1"/>
-          </p:cNvSpPr>
-          <p:nvPr>
-            <p:ph type="body" sz="quarter" idx="4294967295"/>
-          </p:nvPr>
-        </p:nvSpPr>
-        <p:spPr>
-          <a:xfrm>
-            <a:off x="257175" y="1204913"/>
-            <a:ext cx="6346825" cy="5653087"/>
-          </a:xfrm>
-        </p:spPr>
-        <p:txBody>
-          <a:bodyPr/>
-          <a:lstStyle/>
-          <a:p>
-            <a:r>
-              <a:rPr lang="ru-RU" sz="2800" dirty="0" smtClean="0">
-                <a:latin typeface="+mn-lt"/>
-              </a:rPr>
-              <a:t>Приложение не интересует откуда берутся файлы или куда отправляются </a:t>
-            </a:r>
-            <a:endParaRPr lang="en-US" sz="2800" dirty="0" smtClean="0">
-              <a:latin typeface="+mn-lt"/>
-            </a:endParaRPr>
-          </a:p>
-          <a:p>
-            <a:pPr lvl="1"/>
-            <a:endParaRPr lang="ru-RU" sz="2800" dirty="0" smtClean="0"/>
-          </a:p>
-          <a:p>
-            <a:pPr lvl="1"/>
-            <a:r>
-              <a:rPr lang="ru-RU" sz="2800" dirty="0">
-                <a:solidFill>
-                  <a:schemeClr val="accent1"/>
-                </a:solidFill>
-              </a:rPr>
-              <a:t>Простой </a:t>
-            </a:r>
-            <a:r>
-              <a:rPr lang="ru-RU" sz="2800" dirty="0" smtClean="0">
-                <a:solidFill>
-                  <a:schemeClr val="accent1"/>
-                </a:solidFill>
-              </a:rPr>
-              <a:t>доступ </a:t>
-            </a:r>
-            <a:r>
-              <a:rPr lang="ru-RU" sz="2800" dirty="0">
-                <a:solidFill>
-                  <a:schemeClr val="accent1"/>
-                </a:solidFill>
-              </a:rPr>
-              <a:t>к облаку, устройству или </a:t>
-            </a:r>
-            <a:r>
-              <a:rPr lang="ru-RU" sz="2800" dirty="0" smtClean="0">
-                <a:solidFill>
-                  <a:schemeClr val="accent1"/>
-                </a:solidFill>
-              </a:rPr>
-              <a:t>в другое приложение </a:t>
-            </a:r>
-            <a:r>
-              <a:rPr lang="ru-RU" sz="2800" dirty="0">
-                <a:solidFill>
-                  <a:schemeClr val="accent1"/>
-                </a:solidFill>
-              </a:rPr>
-              <a:t>для получения файла </a:t>
-            </a:r>
-          </a:p>
-          <a:p>
-            <a:pPr lvl="1"/>
-            <a:endParaRPr lang="ru-RU" sz="2800" dirty="0" smtClean="0"/>
-          </a:p>
-          <a:p>
-            <a:pPr lvl="1"/>
-            <a:r>
-              <a:rPr lang="ru-RU" sz="2800" dirty="0" smtClean="0">
-                <a:solidFill>
-                  <a:schemeClr val="accent1"/>
-                </a:solidFill>
-              </a:rPr>
-              <a:t>Поддержка операций Открыть и Сохранить </a:t>
-            </a:r>
-          </a:p>
-        </p:txBody>
-      </p:sp>
-    </p:spTree>
-    <p:extLst>
-      <p:ext uri="{BB962C8B-B14F-4D97-AF65-F5344CB8AC3E}">
-        <p14:creationId xmlns:p14="http://schemas.microsoft.com/office/powerpoint/2010/main" val="1540423197"/>
-      </p:ext>
-    </p:extLst>
-  </p:cSld>
-  <p:clrMapOvr>
-    <a:masterClrMapping/>
-  </p:clrMapOvr>
-  <mc:AlternateContent xmlns:mc="http://schemas.openxmlformats.org/markup-compatibility/2006" xmlns:p14="http://schemas.microsoft.com/office/powerpoint/2010/main">
-    <mc:Choice Requires="p14">
-      <p:transition p14:dur="0"/>
-    </mc:Choice>
-    <mc:Fallback xmlns="">
-      <p:transition/>
-    </mc:Fallback>
-  </mc:AlternateContent>
-  <p:timing>
-    <p:tnLst>
-      <p:par>
-        <p:cTn id="1" dur="indefinite" restart="never" nodeType="tmRoot"/>
-      </p:par>
-    </p:tnLst>
-  </p:timing>
-</p:sld>
-</file>
-
-<file path=ppt/slides/slide21.xml><?xml version="1.0" encoding="utf-8"?>
 <p:sld xmlns:a="http://schemas.openxmlformats.org/drawingml/2006/main" xmlns:r="http://schemas.openxmlformats.org/officeDocument/2006/relationships" xmlns:p="http://schemas.openxmlformats.org/presentationml/2006/main">
   <p:cSld>
     <p:spTree>
@@ -25674,7 +25589,7 @@
 </p:sld>
 </file>
 
-<file path=ppt/slides/slide22.xml><?xml version="1.0" encoding="utf-8"?>
+<file path=ppt/slides/slide21.xml><?xml version="1.0" encoding="utf-8"?>
 <p:sld xmlns:a="http://schemas.openxmlformats.org/drawingml/2006/main" xmlns:r="http://schemas.openxmlformats.org/officeDocument/2006/relationships" xmlns:p="http://schemas.openxmlformats.org/presentationml/2006/main">
   <p:cSld>
     <p:spTree>
@@ -26954,7 +26869,7 @@
 </p:sld>
 </file>
 
-<file path=ppt/slides/slide23.xml><?xml version="1.0" encoding="utf-8"?>
+<file path=ppt/slides/slide22.xml><?xml version="1.0" encoding="utf-8"?>
 <p:sld xmlns:a="http://schemas.openxmlformats.org/drawingml/2006/main" xmlns:r="http://schemas.openxmlformats.org/officeDocument/2006/relationships" xmlns:p="http://schemas.openxmlformats.org/presentationml/2006/main">
   <p:cSld>
     <p:spTree>
@@ -26983,8 +26898,8 @@
         </p:nvSpPr>
         <p:spPr>
           <a:xfrm>
-            <a:off x="269239" y="2579602"/>
-            <a:ext cx="11637012" cy="1698798"/>
+            <a:off x="269239" y="2948901"/>
+            <a:ext cx="11637012" cy="960199"/>
           </a:xfrm>
         </p:spPr>
         <p:txBody>
@@ -26992,19 +26907,8 @@
           <a:lstStyle/>
           <a:p>
             <a:r>
-              <a:rPr lang="ru-RU" dirty="0" err="1" smtClean="0"/>
-              <a:t>Демо</a:t>
-            </a:r>
-            <a:r>
-              <a:rPr lang="ru-RU" dirty="0" smtClean="0"/>
-              <a:t>: </a:t>
-            </a:r>
-            <a:br>
-              <a:rPr lang="ru-RU" dirty="0" smtClean="0"/>
-            </a:br>
-            <a:r>
-              <a:rPr lang="ru-RU" dirty="0" smtClean="0"/>
-              <a:t>Использование файловых диалогов</a:t>
+              <a:rPr lang="ru-RU" smtClean="0"/>
+              <a:t>Демонстрация</a:t>
             </a:r>
             <a:endParaRPr lang="en-US" dirty="0"/>
           </a:p>
@@ -27056,7 +26960,7 @@
             <a:fld id="{2775DF8E-1151-4C45-8C93-3AB060627CA9}" type="slidenum">
               <a:rPr lang="en-US" smtClean="0"/>
               <a:pPr/>
-              <a:t>23</a:t>
+              <a:t>22</a:t>
             </a:fld>
             <a:endParaRPr lang="en-US"/>
           </a:p>
@@ -27090,7 +26994,7 @@
 </p:sld>
 </file>
 
-<file path=ppt/slides/slide24.xml><?xml version="1.0" encoding="utf-8"?>
+<file path=ppt/slides/slide23.xml><?xml version="1.0" encoding="utf-8"?>
 <p:sld xmlns:a="http://schemas.openxmlformats.org/drawingml/2006/main" xmlns:r="http://schemas.openxmlformats.org/officeDocument/2006/relationships" xmlns:p="http://schemas.openxmlformats.org/presentationml/2006/main">
   <p:cSld>
     <p:spTree>
@@ -27304,7 +27208,7 @@
 </p:sld>
 </file>
 
-<file path=ppt/slides/slide25.xml><?xml version="1.0" encoding="utf-8"?>
+<file path=ppt/slides/slide24.xml><?xml version="1.0" encoding="utf-8"?>
 <p:sld xmlns:a="http://schemas.openxmlformats.org/drawingml/2006/main" xmlns:r="http://schemas.openxmlformats.org/officeDocument/2006/relationships" xmlns:p="http://schemas.openxmlformats.org/presentationml/2006/main">
   <p:cSld>
     <p:spTree>
@@ -36576,11 +36480,7 @@
           <a:p>
             <a:r>
               <a:rPr lang="ru-RU" sz="6470" dirty="0" smtClean="0"/>
-              <a:t>Хранение </a:t>
-            </a:r>
-            <a:r>
-              <a:rPr lang="ru-RU" sz="6470" dirty="0" smtClean="0"/>
-              <a:t>данных</a:t>
+              <a:t>Хранение данных</a:t>
             </a:r>
             <a:endParaRPr lang="en-US" sz="6470" dirty="0"/>
           </a:p>

</xml_diff>